<commit_message>
Session 02 - 03
</commit_message>
<xml_diff>
--- a/02 - Microservices/02 .pptx
+++ b/02 - Microservices/02 .pptx
@@ -3656,6 +3656,502 @@
           <a:chExt cx="0" cy="0"/>
         </a:xfrm>
       </p:grpSpPr>
+      <p:sp>
+        <p:nvSpPr>
+          <p:cNvPr id="2" name="Hexagon 1">
+            <a:extLst>
+              <a:ext uri="{FF2B5EF4-FFF2-40B4-BE49-F238E27FC236}">
+                <a16:creationId xmlns:a16="http://schemas.microsoft.com/office/drawing/2014/main" id="{2787FA41-542C-C9EA-CF57-DAB59D86DFE6}"/>
+              </a:ext>
+            </a:extLst>
+          </p:cNvPr>
+          <p:cNvSpPr/>
+          <p:nvPr/>
+        </p:nvSpPr>
+        <p:spPr>
+          <a:xfrm>
+            <a:off x="5098473" y="895927"/>
+            <a:ext cx="757382" cy="652916"/>
+          </a:xfrm>
+          <a:prstGeom prst="hexagon">
+            <a:avLst/>
+          </a:prstGeom>
+          <a:noFill/>
+        </p:spPr>
+        <p:style>
+          <a:lnRef idx="2">
+            <a:schemeClr val="accent1">
+              <a:shade val="15000"/>
+            </a:schemeClr>
+          </a:lnRef>
+          <a:fillRef idx="1">
+            <a:schemeClr val="accent1"/>
+          </a:fillRef>
+          <a:effectRef idx="0">
+            <a:schemeClr val="accent1"/>
+          </a:effectRef>
+          <a:fontRef idx="minor">
+            <a:schemeClr val="lt1"/>
+          </a:fontRef>
+        </p:style>
+        <p:txBody>
+          <a:bodyPr rtlCol="0" anchor="ctr"/>
+          <a:lstStyle/>
+          <a:p>
+            <a:pPr algn="ctr"/>
+            <a:endParaRPr lang="es-419"/>
+          </a:p>
+        </p:txBody>
+      </p:sp>
+      <p:sp>
+        <p:nvSpPr>
+          <p:cNvPr id="3" name="Hexagon 2">
+            <a:extLst>
+              <a:ext uri="{FF2B5EF4-FFF2-40B4-BE49-F238E27FC236}">
+                <a16:creationId xmlns:a16="http://schemas.microsoft.com/office/drawing/2014/main" id="{9AB7A2D8-23CB-9300-A33E-A7CE5524DE36}"/>
+              </a:ext>
+            </a:extLst>
+          </p:cNvPr>
+          <p:cNvSpPr/>
+          <p:nvPr/>
+        </p:nvSpPr>
+        <p:spPr>
+          <a:xfrm>
+            <a:off x="5098473" y="2244435"/>
+            <a:ext cx="757382" cy="652916"/>
+          </a:xfrm>
+          <a:prstGeom prst="hexagon">
+            <a:avLst/>
+          </a:prstGeom>
+          <a:noFill/>
+        </p:spPr>
+        <p:style>
+          <a:lnRef idx="2">
+            <a:schemeClr val="accent1">
+              <a:shade val="15000"/>
+            </a:schemeClr>
+          </a:lnRef>
+          <a:fillRef idx="1">
+            <a:schemeClr val="accent1"/>
+          </a:fillRef>
+          <a:effectRef idx="0">
+            <a:schemeClr val="accent1"/>
+          </a:effectRef>
+          <a:fontRef idx="minor">
+            <a:schemeClr val="lt1"/>
+          </a:fontRef>
+        </p:style>
+        <p:txBody>
+          <a:bodyPr rtlCol="0" anchor="ctr"/>
+          <a:lstStyle/>
+          <a:p>
+            <a:pPr algn="ctr"/>
+            <a:endParaRPr lang="es-419"/>
+          </a:p>
+        </p:txBody>
+      </p:sp>
+      <p:sp>
+        <p:nvSpPr>
+          <p:cNvPr id="4" name="TextBox 3">
+            <a:extLst>
+              <a:ext uri="{FF2B5EF4-FFF2-40B4-BE49-F238E27FC236}">
+                <a16:creationId xmlns:a16="http://schemas.microsoft.com/office/drawing/2014/main" id="{EAC443E2-598E-0DB7-D932-1AC0994D6274}"/>
+              </a:ext>
+            </a:extLst>
+          </p:cNvPr>
+          <p:cNvSpPr txBox="1"/>
+          <p:nvPr/>
+        </p:nvSpPr>
+        <p:spPr>
+          <a:xfrm>
+            <a:off x="5181600" y="526473"/>
+            <a:ext cx="1101840" cy="369332"/>
+          </a:xfrm>
+          <a:prstGeom prst="rect">
+            <a:avLst/>
+          </a:prstGeom>
+          <a:noFill/>
+        </p:spPr>
+        <p:txBody>
+          <a:bodyPr wrap="none" rtlCol="0">
+            <a:spAutoFit/>
+          </a:bodyPr>
+          <a:lstStyle/>
+          <a:p>
+            <a:r>
+              <a:rPr lang="es-419" dirty="0" err="1"/>
+              <a:t>Service</a:t>
+            </a:r>
+            <a:r>
+              <a:rPr lang="es-419" dirty="0"/>
+              <a:t> A</a:t>
+            </a:r>
+          </a:p>
+        </p:txBody>
+      </p:sp>
+      <p:sp>
+        <p:nvSpPr>
+          <p:cNvPr id="5" name="TextBox 4">
+            <a:extLst>
+              <a:ext uri="{FF2B5EF4-FFF2-40B4-BE49-F238E27FC236}">
+                <a16:creationId xmlns:a16="http://schemas.microsoft.com/office/drawing/2014/main" id="{515D9BF9-E2D1-D247-E3E2-2CC70BA57E01}"/>
+              </a:ext>
+            </a:extLst>
+          </p:cNvPr>
+          <p:cNvSpPr txBox="1"/>
+          <p:nvPr/>
+        </p:nvSpPr>
+        <p:spPr>
+          <a:xfrm>
+            <a:off x="5181600" y="1875103"/>
+            <a:ext cx="1105046" cy="369332"/>
+          </a:xfrm>
+          <a:prstGeom prst="rect">
+            <a:avLst/>
+          </a:prstGeom>
+          <a:noFill/>
+        </p:spPr>
+        <p:txBody>
+          <a:bodyPr wrap="none" rtlCol="0">
+            <a:spAutoFit/>
+          </a:bodyPr>
+          <a:lstStyle/>
+          <a:p>
+            <a:r>
+              <a:rPr lang="es-419" dirty="0" err="1"/>
+              <a:t>Service</a:t>
+            </a:r>
+            <a:r>
+              <a:rPr lang="es-419" dirty="0"/>
+              <a:t> B</a:t>
+            </a:r>
+          </a:p>
+        </p:txBody>
+      </p:sp>
+      <p:sp>
+        <p:nvSpPr>
+          <p:cNvPr id="6" name="Hexagon 5">
+            <a:extLst>
+              <a:ext uri="{FF2B5EF4-FFF2-40B4-BE49-F238E27FC236}">
+                <a16:creationId xmlns:a16="http://schemas.microsoft.com/office/drawing/2014/main" id="{FCAC3BFD-E5BA-E639-542B-3CA583C9C046}"/>
+              </a:ext>
+            </a:extLst>
+          </p:cNvPr>
+          <p:cNvSpPr/>
+          <p:nvPr/>
+        </p:nvSpPr>
+        <p:spPr>
+          <a:xfrm>
+            <a:off x="3297382" y="1406853"/>
+            <a:ext cx="757382" cy="652916"/>
+          </a:xfrm>
+          <a:prstGeom prst="hexagon">
+            <a:avLst/>
+          </a:prstGeom>
+          <a:noFill/>
+        </p:spPr>
+        <p:style>
+          <a:lnRef idx="2">
+            <a:schemeClr val="accent1">
+              <a:shade val="15000"/>
+            </a:schemeClr>
+          </a:lnRef>
+          <a:fillRef idx="1">
+            <a:schemeClr val="accent1"/>
+          </a:fillRef>
+          <a:effectRef idx="0">
+            <a:schemeClr val="accent1"/>
+          </a:effectRef>
+          <a:fontRef idx="minor">
+            <a:schemeClr val="lt1"/>
+          </a:fontRef>
+        </p:style>
+        <p:txBody>
+          <a:bodyPr rtlCol="0" anchor="ctr"/>
+          <a:lstStyle/>
+          <a:p>
+            <a:pPr algn="ctr"/>
+            <a:endParaRPr lang="es-419"/>
+          </a:p>
+        </p:txBody>
+      </p:sp>
+      <p:grpSp>
+        <p:nvGrpSpPr>
+          <p:cNvPr id="9" name="Group 8">
+            <a:extLst>
+              <a:ext uri="{FF2B5EF4-FFF2-40B4-BE49-F238E27FC236}">
+                <a16:creationId xmlns:a16="http://schemas.microsoft.com/office/drawing/2014/main" id="{588DEB2D-AAE1-6806-C5E6-657EB145865A}"/>
+              </a:ext>
+            </a:extLst>
+          </p:cNvPr>
+          <p:cNvGrpSpPr/>
+          <p:nvPr/>
+        </p:nvGrpSpPr>
+        <p:grpSpPr>
+          <a:xfrm>
+            <a:off x="582979" y="1322580"/>
+            <a:ext cx="1105046" cy="1105046"/>
+            <a:chOff x="573742" y="1407460"/>
+            <a:chExt cx="1757082" cy="1757082"/>
+          </a:xfrm>
+        </p:grpSpPr>
+        <p:sp>
+          <p:nvSpPr>
+            <p:cNvPr id="7" name="Rectangle: Rounded Corners 6">
+              <a:extLst>
+                <a:ext uri="{FF2B5EF4-FFF2-40B4-BE49-F238E27FC236}">
+                  <a16:creationId xmlns:a16="http://schemas.microsoft.com/office/drawing/2014/main" id="{79CAA9C6-5C80-9140-441E-64283A252D0D}"/>
+                </a:ext>
+              </a:extLst>
+            </p:cNvPr>
+            <p:cNvSpPr/>
+            <p:nvPr/>
+          </p:nvSpPr>
+          <p:spPr>
+            <a:xfrm>
+              <a:off x="681318" y="1407460"/>
+              <a:ext cx="1649506" cy="1246094"/>
+            </a:xfrm>
+            <a:prstGeom prst="roundRect">
+              <a:avLst/>
+            </a:prstGeom>
+          </p:spPr>
+          <p:style>
+            <a:lnRef idx="2">
+              <a:schemeClr val="dk1"/>
+            </a:lnRef>
+            <a:fillRef idx="1">
+              <a:schemeClr val="lt1"/>
+            </a:fillRef>
+            <a:effectRef idx="0">
+              <a:schemeClr val="dk1"/>
+            </a:effectRef>
+            <a:fontRef idx="minor">
+              <a:schemeClr val="dk1"/>
+            </a:fontRef>
+          </p:style>
+          <p:txBody>
+            <a:bodyPr rtlCol="0" anchor="ctr"/>
+            <a:lstStyle/>
+            <a:p>
+              <a:pPr algn="ctr"/>
+              <a:endParaRPr lang="es-419"/>
+            </a:p>
+          </p:txBody>
+        </p:sp>
+        <p:sp>
+          <p:nvSpPr>
+            <p:cNvPr id="8" name="Parallelogram 7">
+              <a:extLst>
+                <a:ext uri="{FF2B5EF4-FFF2-40B4-BE49-F238E27FC236}">
+                  <a16:creationId xmlns:a16="http://schemas.microsoft.com/office/drawing/2014/main" id="{6B79036A-BD7D-D7EB-B1CF-8E080C764857}"/>
+                </a:ext>
+              </a:extLst>
+            </p:cNvPr>
+            <p:cNvSpPr/>
+            <p:nvPr/>
+          </p:nvSpPr>
+          <p:spPr>
+            <a:xfrm>
+              <a:off x="573742" y="2779059"/>
+              <a:ext cx="1730188" cy="385483"/>
+            </a:xfrm>
+            <a:prstGeom prst="parallelogram">
+              <a:avLst/>
+            </a:prstGeom>
+            <a:noFill/>
+          </p:spPr>
+          <p:style>
+            <a:lnRef idx="2">
+              <a:schemeClr val="accent1">
+                <a:shade val="15000"/>
+              </a:schemeClr>
+            </a:lnRef>
+            <a:fillRef idx="1">
+              <a:schemeClr val="accent1"/>
+            </a:fillRef>
+            <a:effectRef idx="0">
+              <a:schemeClr val="accent1"/>
+            </a:effectRef>
+            <a:fontRef idx="minor">
+              <a:schemeClr val="lt1"/>
+            </a:fontRef>
+          </p:style>
+          <p:txBody>
+            <a:bodyPr rtlCol="0" anchor="ctr"/>
+            <a:lstStyle/>
+            <a:p>
+              <a:pPr algn="ctr"/>
+              <a:endParaRPr lang="es-419"/>
+            </a:p>
+          </p:txBody>
+        </p:sp>
+      </p:grpSp>
+      <p:cxnSp>
+        <p:nvCxnSpPr>
+          <p:cNvPr id="11" name="Straight Arrow Connector 10">
+            <a:extLst>
+              <a:ext uri="{FF2B5EF4-FFF2-40B4-BE49-F238E27FC236}">
+                <a16:creationId xmlns:a16="http://schemas.microsoft.com/office/drawing/2014/main" id="{4F1AE990-619D-F05F-6BE4-59F152250F84}"/>
+              </a:ext>
+            </a:extLst>
+          </p:cNvPr>
+          <p:cNvCxnSpPr>
+            <a:stCxn id="7" idx="3"/>
+            <a:endCxn id="6" idx="3"/>
+          </p:cNvCxnSpPr>
+          <p:nvPr/>
+        </p:nvCxnSpPr>
+        <p:spPr>
+          <a:xfrm>
+            <a:off x="1688025" y="1714421"/>
+            <a:ext cx="1609357" cy="18890"/>
+          </a:xfrm>
+          <a:prstGeom prst="straightConnector1">
+            <a:avLst/>
+          </a:prstGeom>
+          <a:ln>
+            <a:tailEnd type="triangle"/>
+          </a:ln>
+        </p:spPr>
+        <p:style>
+          <a:lnRef idx="2">
+            <a:schemeClr val="accent1"/>
+          </a:lnRef>
+          <a:fillRef idx="0">
+            <a:schemeClr val="accent1"/>
+          </a:fillRef>
+          <a:effectRef idx="1">
+            <a:schemeClr val="accent1"/>
+          </a:effectRef>
+          <a:fontRef idx="minor">
+            <a:schemeClr val="tx1"/>
+          </a:fontRef>
+        </p:style>
+      </p:cxnSp>
+      <p:cxnSp>
+        <p:nvCxnSpPr>
+          <p:cNvPr id="13" name="Straight Arrow Connector 12">
+            <a:extLst>
+              <a:ext uri="{FF2B5EF4-FFF2-40B4-BE49-F238E27FC236}">
+                <a16:creationId xmlns:a16="http://schemas.microsoft.com/office/drawing/2014/main" id="{1ECAE92A-8AC5-27FB-79F1-3D84A40D4A05}"/>
+              </a:ext>
+            </a:extLst>
+          </p:cNvPr>
+          <p:cNvCxnSpPr>
+            <a:stCxn id="6" idx="0"/>
+            <a:endCxn id="2" idx="3"/>
+          </p:cNvCxnSpPr>
+          <p:nvPr/>
+        </p:nvCxnSpPr>
+        <p:spPr>
+          <a:xfrm flipV="1">
+            <a:off x="4054764" y="1222385"/>
+            <a:ext cx="1043709" cy="510926"/>
+          </a:xfrm>
+          <a:prstGeom prst="straightConnector1">
+            <a:avLst/>
+          </a:prstGeom>
+          <a:ln>
+            <a:tailEnd type="triangle"/>
+          </a:ln>
+        </p:spPr>
+        <p:style>
+          <a:lnRef idx="2">
+            <a:schemeClr val="accent1"/>
+          </a:lnRef>
+          <a:fillRef idx="0">
+            <a:schemeClr val="accent1"/>
+          </a:fillRef>
+          <a:effectRef idx="1">
+            <a:schemeClr val="accent1"/>
+          </a:effectRef>
+          <a:fontRef idx="minor">
+            <a:schemeClr val="tx1"/>
+          </a:fontRef>
+        </p:style>
+      </p:cxnSp>
+      <p:cxnSp>
+        <p:nvCxnSpPr>
+          <p:cNvPr id="15" name="Straight Arrow Connector 14">
+            <a:extLst>
+              <a:ext uri="{FF2B5EF4-FFF2-40B4-BE49-F238E27FC236}">
+                <a16:creationId xmlns:a16="http://schemas.microsoft.com/office/drawing/2014/main" id="{77C5E7C9-21E3-64C0-C63E-B303AC93591C}"/>
+              </a:ext>
+            </a:extLst>
+          </p:cNvPr>
+          <p:cNvCxnSpPr>
+            <a:stCxn id="6" idx="0"/>
+            <a:endCxn id="3" idx="3"/>
+          </p:cNvCxnSpPr>
+          <p:nvPr/>
+        </p:nvCxnSpPr>
+        <p:spPr>
+          <a:xfrm>
+            <a:off x="4054764" y="1733311"/>
+            <a:ext cx="1043709" cy="837582"/>
+          </a:xfrm>
+          <a:prstGeom prst="straightConnector1">
+            <a:avLst/>
+          </a:prstGeom>
+          <a:ln>
+            <a:tailEnd type="triangle"/>
+          </a:ln>
+        </p:spPr>
+        <p:style>
+          <a:lnRef idx="2">
+            <a:schemeClr val="accent1"/>
+          </a:lnRef>
+          <a:fillRef idx="0">
+            <a:schemeClr val="accent1"/>
+          </a:fillRef>
+          <a:effectRef idx="1">
+            <a:schemeClr val="accent1"/>
+          </a:effectRef>
+          <a:fontRef idx="minor">
+            <a:schemeClr val="tx1"/>
+          </a:fontRef>
+        </p:style>
+      </p:cxnSp>
+      <p:sp>
+        <p:nvSpPr>
+          <p:cNvPr id="16" name="TextBox 15">
+            <a:extLst>
+              <a:ext uri="{FF2B5EF4-FFF2-40B4-BE49-F238E27FC236}">
+                <a16:creationId xmlns:a16="http://schemas.microsoft.com/office/drawing/2014/main" id="{17BCD26B-EA17-56E2-560C-FED640DB3A3D}"/>
+              </a:ext>
+            </a:extLst>
+          </p:cNvPr>
+          <p:cNvSpPr txBox="1"/>
+          <p:nvPr/>
+        </p:nvSpPr>
+        <p:spPr>
+          <a:xfrm>
+            <a:off x="3364184" y="1016084"/>
+            <a:ext cx="1125886" cy="369332"/>
+          </a:xfrm>
+          <a:prstGeom prst="rect">
+            <a:avLst/>
+          </a:prstGeom>
+          <a:noFill/>
+        </p:spPr>
+        <p:txBody>
+          <a:bodyPr wrap="none" rtlCol="0">
+            <a:spAutoFit/>
+          </a:bodyPr>
+          <a:lstStyle/>
+          <a:p>
+            <a:r>
+              <a:rPr lang="es-419" dirty="0" err="1"/>
+              <a:t>Service</a:t>
+            </a:r>
+            <a:r>
+              <a:rPr lang="es-419" dirty="0"/>
+              <a:t> C</a:t>
+            </a:r>
+          </a:p>
+        </p:txBody>
+      </p:sp>
     </p:spTree>
     <p:extLst>
       <p:ext uri="{BB962C8B-B14F-4D97-AF65-F5344CB8AC3E}">

</xml_diff>